<commit_message>
Production doc builds - 2021/08/11 00:32:11 UTC
</commit_message>
<xml_diff>
--- a/docs/images/apache-superset-architecture-diagram.pptx
+++ b/docs/images/apache-superset-architecture-diagram.pptx
@@ -154,7 +154,7 @@
           </a:lstStyle>
           <a:p>
             <a:r>
-              <a:rPr lang="en-US"/>
+              <a:rPr lang="en-US" smtClean="0"/>
               <a:t>Click to edit Master title style</a:t>
             </a:r>
             <a:endParaRPr lang="en-US" dirty="0"/>
@@ -219,7 +219,7 @@
           </a:lstStyle>
           <a:p>
             <a:r>
-              <a:rPr lang="en-US"/>
+              <a:rPr lang="en-US" smtClean="0"/>
               <a:t>Click to edit Master subtitle style</a:t>
             </a:r>
             <a:endParaRPr lang="en-US" dirty="0"/>
@@ -243,7 +243,7 @@
           <a:p>
             <a:fld id="{C1413EED-5722-7C4B-AAEA-A5EA7F954977}" type="datetimeFigureOut">
               <a:rPr lang="en-US" smtClean="0"/>
-              <a:t>8/10/21</a:t>
+              <a:t>8/10/2021</a:t>
             </a:fld>
             <a:endParaRPr lang="en-US"/>
           </a:p>
@@ -337,7 +337,7 @@
           <a:lstStyle/>
           <a:p>
             <a:r>
-              <a:rPr lang="en-US"/>
+              <a:rPr lang="en-US" smtClean="0"/>
               <a:t>Click to edit Master title style</a:t>
             </a:r>
             <a:endParaRPr lang="en-US" dirty="0"/>
@@ -361,35 +361,35 @@
           <a:p>
             <a:pPr lvl="0"/>
             <a:r>
-              <a:rPr lang="en-US"/>
+              <a:rPr lang="en-US" smtClean="0"/>
               <a:t>Edit Master text styles</a:t>
             </a:r>
           </a:p>
           <a:p>
             <a:pPr lvl="1"/>
             <a:r>
-              <a:rPr lang="en-US"/>
+              <a:rPr lang="en-US" smtClean="0"/>
               <a:t>Second level</a:t>
             </a:r>
           </a:p>
           <a:p>
             <a:pPr lvl="2"/>
             <a:r>
-              <a:rPr lang="en-US"/>
+              <a:rPr lang="en-US" smtClean="0"/>
               <a:t>Third level</a:t>
             </a:r>
           </a:p>
           <a:p>
             <a:pPr lvl="3"/>
             <a:r>
-              <a:rPr lang="en-US"/>
+              <a:rPr lang="en-US" smtClean="0"/>
               <a:t>Fourth level</a:t>
             </a:r>
           </a:p>
           <a:p>
             <a:pPr lvl="4"/>
             <a:r>
-              <a:rPr lang="en-US"/>
+              <a:rPr lang="en-US" smtClean="0"/>
               <a:t>Fifth level</a:t>
             </a:r>
             <a:endParaRPr lang="en-US" dirty="0"/>
@@ -413,7 +413,7 @@
           <a:p>
             <a:fld id="{C1413EED-5722-7C4B-AAEA-A5EA7F954977}" type="datetimeFigureOut">
               <a:rPr lang="en-US" smtClean="0"/>
-              <a:t>8/10/21</a:t>
+              <a:t>8/10/2021</a:t>
             </a:fld>
             <a:endParaRPr lang="en-US"/>
           </a:p>
@@ -512,7 +512,7 @@
           <a:lstStyle/>
           <a:p>
             <a:r>
-              <a:rPr lang="en-US"/>
+              <a:rPr lang="en-US" smtClean="0"/>
               <a:t>Click to edit Master title style</a:t>
             </a:r>
             <a:endParaRPr lang="en-US" dirty="0"/>
@@ -541,35 +541,35 @@
           <a:p>
             <a:pPr lvl="0"/>
             <a:r>
-              <a:rPr lang="en-US"/>
+              <a:rPr lang="en-US" smtClean="0"/>
               <a:t>Edit Master text styles</a:t>
             </a:r>
           </a:p>
           <a:p>
             <a:pPr lvl="1"/>
             <a:r>
-              <a:rPr lang="en-US"/>
+              <a:rPr lang="en-US" smtClean="0"/>
               <a:t>Second level</a:t>
             </a:r>
           </a:p>
           <a:p>
             <a:pPr lvl="2"/>
             <a:r>
-              <a:rPr lang="en-US"/>
+              <a:rPr lang="en-US" smtClean="0"/>
               <a:t>Third level</a:t>
             </a:r>
           </a:p>
           <a:p>
             <a:pPr lvl="3"/>
             <a:r>
-              <a:rPr lang="en-US"/>
+              <a:rPr lang="en-US" smtClean="0"/>
               <a:t>Fourth level</a:t>
             </a:r>
           </a:p>
           <a:p>
             <a:pPr lvl="4"/>
             <a:r>
-              <a:rPr lang="en-US"/>
+              <a:rPr lang="en-US" smtClean="0"/>
               <a:t>Fifth level</a:t>
             </a:r>
             <a:endParaRPr lang="en-US" dirty="0"/>
@@ -593,7 +593,7 @@
           <a:p>
             <a:fld id="{C1413EED-5722-7C4B-AAEA-A5EA7F954977}" type="datetimeFigureOut">
               <a:rPr lang="en-US" smtClean="0"/>
-              <a:t>8/10/21</a:t>
+              <a:t>8/10/2021</a:t>
             </a:fld>
             <a:endParaRPr lang="en-US"/>
           </a:p>
@@ -687,7 +687,7 @@
           <a:lstStyle/>
           <a:p>
             <a:r>
-              <a:rPr lang="en-US"/>
+              <a:rPr lang="en-US" smtClean="0"/>
               <a:t>Click to edit Master title style</a:t>
             </a:r>
             <a:endParaRPr lang="en-US" dirty="0"/>
@@ -711,35 +711,35 @@
           <a:p>
             <a:pPr lvl="0"/>
             <a:r>
-              <a:rPr lang="en-US"/>
+              <a:rPr lang="en-US" smtClean="0"/>
               <a:t>Edit Master text styles</a:t>
             </a:r>
           </a:p>
           <a:p>
             <a:pPr lvl="1"/>
             <a:r>
-              <a:rPr lang="en-US"/>
+              <a:rPr lang="en-US" smtClean="0"/>
               <a:t>Second level</a:t>
             </a:r>
           </a:p>
           <a:p>
             <a:pPr lvl="2"/>
             <a:r>
-              <a:rPr lang="en-US"/>
+              <a:rPr lang="en-US" smtClean="0"/>
               <a:t>Third level</a:t>
             </a:r>
           </a:p>
           <a:p>
             <a:pPr lvl="3"/>
             <a:r>
-              <a:rPr lang="en-US"/>
+              <a:rPr lang="en-US" smtClean="0"/>
               <a:t>Fourth level</a:t>
             </a:r>
           </a:p>
           <a:p>
             <a:pPr lvl="4"/>
             <a:r>
-              <a:rPr lang="en-US"/>
+              <a:rPr lang="en-US" smtClean="0"/>
               <a:t>Fifth level</a:t>
             </a:r>
             <a:endParaRPr lang="en-US" dirty="0"/>
@@ -763,7 +763,7 @@
           <a:p>
             <a:fld id="{C1413EED-5722-7C4B-AAEA-A5EA7F954977}" type="datetimeFigureOut">
               <a:rPr lang="en-US" smtClean="0"/>
-              <a:t>8/10/21</a:t>
+              <a:t>8/10/2021</a:t>
             </a:fld>
             <a:endParaRPr lang="en-US"/>
           </a:p>
@@ -866,7 +866,7 @@
           </a:lstStyle>
           <a:p>
             <a:r>
-              <a:rPr lang="en-US"/>
+              <a:rPr lang="en-US" smtClean="0"/>
               <a:t>Click to edit Master title style</a:t>
             </a:r>
             <a:endParaRPr lang="en-US" dirty="0"/>
@@ -984,7 +984,7 @@
           <a:p>
             <a:pPr lvl="0"/>
             <a:r>
-              <a:rPr lang="en-US"/>
+              <a:rPr lang="en-US" smtClean="0"/>
               <a:t>Edit Master text styles</a:t>
             </a:r>
           </a:p>
@@ -1007,7 +1007,7 @@
           <a:p>
             <a:fld id="{C1413EED-5722-7C4B-AAEA-A5EA7F954977}" type="datetimeFigureOut">
               <a:rPr lang="en-US" smtClean="0"/>
-              <a:t>8/10/21</a:t>
+              <a:t>8/10/2021</a:t>
             </a:fld>
             <a:endParaRPr lang="en-US"/>
           </a:p>
@@ -1101,7 +1101,7 @@
           <a:lstStyle/>
           <a:p>
             <a:r>
-              <a:rPr lang="en-US"/>
+              <a:rPr lang="en-US" smtClean="0"/>
               <a:t>Click to edit Master title style</a:t>
             </a:r>
             <a:endParaRPr lang="en-US" dirty="0"/>
@@ -1130,35 +1130,35 @@
           <a:p>
             <a:pPr lvl="0"/>
             <a:r>
-              <a:rPr lang="en-US"/>
+              <a:rPr lang="en-US" smtClean="0"/>
               <a:t>Edit Master text styles</a:t>
             </a:r>
           </a:p>
           <a:p>
             <a:pPr lvl="1"/>
             <a:r>
-              <a:rPr lang="en-US"/>
+              <a:rPr lang="en-US" smtClean="0"/>
               <a:t>Second level</a:t>
             </a:r>
           </a:p>
           <a:p>
             <a:pPr lvl="2"/>
             <a:r>
-              <a:rPr lang="en-US"/>
+              <a:rPr lang="en-US" smtClean="0"/>
               <a:t>Third level</a:t>
             </a:r>
           </a:p>
           <a:p>
             <a:pPr lvl="3"/>
             <a:r>
-              <a:rPr lang="en-US"/>
+              <a:rPr lang="en-US" smtClean="0"/>
               <a:t>Fourth level</a:t>
             </a:r>
           </a:p>
           <a:p>
             <a:pPr lvl="4"/>
             <a:r>
-              <a:rPr lang="en-US"/>
+              <a:rPr lang="en-US" smtClean="0"/>
               <a:t>Fifth level</a:t>
             </a:r>
             <a:endParaRPr lang="en-US" dirty="0"/>
@@ -1187,35 +1187,35 @@
           <a:p>
             <a:pPr lvl="0"/>
             <a:r>
-              <a:rPr lang="en-US"/>
+              <a:rPr lang="en-US" smtClean="0"/>
               <a:t>Edit Master text styles</a:t>
             </a:r>
           </a:p>
           <a:p>
             <a:pPr lvl="1"/>
             <a:r>
-              <a:rPr lang="en-US"/>
+              <a:rPr lang="en-US" smtClean="0"/>
               <a:t>Second level</a:t>
             </a:r>
           </a:p>
           <a:p>
             <a:pPr lvl="2"/>
             <a:r>
-              <a:rPr lang="en-US"/>
+              <a:rPr lang="en-US" smtClean="0"/>
               <a:t>Third level</a:t>
             </a:r>
           </a:p>
           <a:p>
             <a:pPr lvl="3"/>
             <a:r>
-              <a:rPr lang="en-US"/>
+              <a:rPr lang="en-US" smtClean="0"/>
               <a:t>Fourth level</a:t>
             </a:r>
           </a:p>
           <a:p>
             <a:pPr lvl="4"/>
             <a:r>
-              <a:rPr lang="en-US"/>
+              <a:rPr lang="en-US" smtClean="0"/>
               <a:t>Fifth level</a:t>
             </a:r>
             <a:endParaRPr lang="en-US" dirty="0"/>
@@ -1239,7 +1239,7 @@
           <a:p>
             <a:fld id="{C1413EED-5722-7C4B-AAEA-A5EA7F954977}" type="datetimeFigureOut">
               <a:rPr lang="en-US" smtClean="0"/>
-              <a:t>8/10/21</a:t>
+              <a:t>8/10/2021</a:t>
             </a:fld>
             <a:endParaRPr lang="en-US"/>
           </a:p>
@@ -1338,7 +1338,7 @@
           <a:lstStyle/>
           <a:p>
             <a:r>
-              <a:rPr lang="en-US"/>
+              <a:rPr lang="en-US" smtClean="0"/>
               <a:t>Click to edit Master title style</a:t>
             </a:r>
             <a:endParaRPr lang="en-US" dirty="0"/>
@@ -1404,7 +1404,7 @@
           <a:p>
             <a:pPr lvl="0"/>
             <a:r>
-              <a:rPr lang="en-US"/>
+              <a:rPr lang="en-US" smtClean="0"/>
               <a:t>Edit Master text styles</a:t>
             </a:r>
           </a:p>
@@ -1432,35 +1432,35 @@
           <a:p>
             <a:pPr lvl="0"/>
             <a:r>
-              <a:rPr lang="en-US"/>
+              <a:rPr lang="en-US" smtClean="0"/>
               <a:t>Edit Master text styles</a:t>
             </a:r>
           </a:p>
           <a:p>
             <a:pPr lvl="1"/>
             <a:r>
-              <a:rPr lang="en-US"/>
+              <a:rPr lang="en-US" smtClean="0"/>
               <a:t>Second level</a:t>
             </a:r>
           </a:p>
           <a:p>
             <a:pPr lvl="2"/>
             <a:r>
-              <a:rPr lang="en-US"/>
+              <a:rPr lang="en-US" smtClean="0"/>
               <a:t>Third level</a:t>
             </a:r>
           </a:p>
           <a:p>
             <a:pPr lvl="3"/>
             <a:r>
-              <a:rPr lang="en-US"/>
+              <a:rPr lang="en-US" smtClean="0"/>
               <a:t>Fourth level</a:t>
             </a:r>
           </a:p>
           <a:p>
             <a:pPr lvl="4"/>
             <a:r>
-              <a:rPr lang="en-US"/>
+              <a:rPr lang="en-US" smtClean="0"/>
               <a:t>Fifth level</a:t>
             </a:r>
             <a:endParaRPr lang="en-US" dirty="0"/>
@@ -1526,7 +1526,7 @@
           <a:p>
             <a:pPr lvl="0"/>
             <a:r>
-              <a:rPr lang="en-US"/>
+              <a:rPr lang="en-US" smtClean="0"/>
               <a:t>Edit Master text styles</a:t>
             </a:r>
           </a:p>
@@ -1554,35 +1554,35 @@
           <a:p>
             <a:pPr lvl="0"/>
             <a:r>
-              <a:rPr lang="en-US"/>
+              <a:rPr lang="en-US" smtClean="0"/>
               <a:t>Edit Master text styles</a:t>
             </a:r>
           </a:p>
           <a:p>
             <a:pPr lvl="1"/>
             <a:r>
-              <a:rPr lang="en-US"/>
+              <a:rPr lang="en-US" smtClean="0"/>
               <a:t>Second level</a:t>
             </a:r>
           </a:p>
           <a:p>
             <a:pPr lvl="2"/>
             <a:r>
-              <a:rPr lang="en-US"/>
+              <a:rPr lang="en-US" smtClean="0"/>
               <a:t>Third level</a:t>
             </a:r>
           </a:p>
           <a:p>
             <a:pPr lvl="3"/>
             <a:r>
-              <a:rPr lang="en-US"/>
+              <a:rPr lang="en-US" smtClean="0"/>
               <a:t>Fourth level</a:t>
             </a:r>
           </a:p>
           <a:p>
             <a:pPr lvl="4"/>
             <a:r>
-              <a:rPr lang="en-US"/>
+              <a:rPr lang="en-US" smtClean="0"/>
               <a:t>Fifth level</a:t>
             </a:r>
             <a:endParaRPr lang="en-US" dirty="0"/>
@@ -1606,7 +1606,7 @@
           <a:p>
             <a:fld id="{C1413EED-5722-7C4B-AAEA-A5EA7F954977}" type="datetimeFigureOut">
               <a:rPr lang="en-US" smtClean="0"/>
-              <a:t>8/10/21</a:t>
+              <a:t>8/10/2021</a:t>
             </a:fld>
             <a:endParaRPr lang="en-US"/>
           </a:p>
@@ -1700,7 +1700,7 @@
           <a:lstStyle/>
           <a:p>
             <a:r>
-              <a:rPr lang="en-US"/>
+              <a:rPr lang="en-US" smtClean="0"/>
               <a:t>Click to edit Master title style</a:t>
             </a:r>
             <a:endParaRPr lang="en-US" dirty="0"/>
@@ -1724,7 +1724,7 @@
           <a:p>
             <a:fld id="{C1413EED-5722-7C4B-AAEA-A5EA7F954977}" type="datetimeFigureOut">
               <a:rPr lang="en-US" smtClean="0"/>
-              <a:t>8/10/21</a:t>
+              <a:t>8/10/2021</a:t>
             </a:fld>
             <a:endParaRPr lang="en-US"/>
           </a:p>
@@ -1819,7 +1819,7 @@
           <a:p>
             <a:fld id="{C1413EED-5722-7C4B-AAEA-A5EA7F954977}" type="datetimeFigureOut">
               <a:rPr lang="en-US" smtClean="0"/>
-              <a:t>8/10/21</a:t>
+              <a:t>8/10/2021</a:t>
             </a:fld>
             <a:endParaRPr lang="en-US"/>
           </a:p>
@@ -1922,7 +1922,7 @@
           </a:lstStyle>
           <a:p>
             <a:r>
-              <a:rPr lang="en-US"/>
+              <a:rPr lang="en-US" smtClean="0"/>
               <a:t>Click to edit Master title style</a:t>
             </a:r>
             <a:endParaRPr lang="en-US" dirty="0"/>
@@ -1979,35 +1979,35 @@
           <a:p>
             <a:pPr lvl="0"/>
             <a:r>
-              <a:rPr lang="en-US"/>
+              <a:rPr lang="en-US" smtClean="0"/>
               <a:t>Edit Master text styles</a:t>
             </a:r>
           </a:p>
           <a:p>
             <a:pPr lvl="1"/>
             <a:r>
-              <a:rPr lang="en-US"/>
+              <a:rPr lang="en-US" smtClean="0"/>
               <a:t>Second level</a:t>
             </a:r>
           </a:p>
           <a:p>
             <a:pPr lvl="2"/>
             <a:r>
-              <a:rPr lang="en-US"/>
+              <a:rPr lang="en-US" smtClean="0"/>
               <a:t>Third level</a:t>
             </a:r>
           </a:p>
           <a:p>
             <a:pPr lvl="3"/>
             <a:r>
-              <a:rPr lang="en-US"/>
+              <a:rPr lang="en-US" smtClean="0"/>
               <a:t>Fourth level</a:t>
             </a:r>
           </a:p>
           <a:p>
             <a:pPr lvl="4"/>
             <a:r>
-              <a:rPr lang="en-US"/>
+              <a:rPr lang="en-US" smtClean="0"/>
               <a:t>Fifth level</a:t>
             </a:r>
             <a:endParaRPr lang="en-US" dirty="0"/>
@@ -2073,7 +2073,7 @@
           <a:p>
             <a:pPr lvl="0"/>
             <a:r>
-              <a:rPr lang="en-US"/>
+              <a:rPr lang="en-US" smtClean="0"/>
               <a:t>Edit Master text styles</a:t>
             </a:r>
           </a:p>
@@ -2096,7 +2096,7 @@
           <a:p>
             <a:fld id="{C1413EED-5722-7C4B-AAEA-A5EA7F954977}" type="datetimeFigureOut">
               <a:rPr lang="en-US" smtClean="0"/>
-              <a:t>8/10/21</a:t>
+              <a:t>8/10/2021</a:t>
             </a:fld>
             <a:endParaRPr lang="en-US"/>
           </a:p>
@@ -2199,7 +2199,7 @@
           </a:lstStyle>
           <a:p>
             <a:r>
-              <a:rPr lang="en-US"/>
+              <a:rPr lang="en-US" smtClean="0"/>
               <a:t>Click to edit Master title style</a:t>
             </a:r>
             <a:endParaRPr lang="en-US" dirty="0"/>
@@ -2264,7 +2264,7 @@
           </a:lstStyle>
           <a:p>
             <a:r>
-              <a:rPr lang="en-US"/>
+              <a:rPr lang="en-US" smtClean="0"/>
               <a:t>Click icon to add picture</a:t>
             </a:r>
             <a:endParaRPr lang="en-US" dirty="0"/>
@@ -2330,7 +2330,7 @@
           <a:p>
             <a:pPr lvl="0"/>
             <a:r>
-              <a:rPr lang="en-US"/>
+              <a:rPr lang="en-US" smtClean="0"/>
               <a:t>Edit Master text styles</a:t>
             </a:r>
           </a:p>
@@ -2353,7 +2353,7 @@
           <a:p>
             <a:fld id="{C1413EED-5722-7C4B-AAEA-A5EA7F954977}" type="datetimeFigureOut">
               <a:rPr lang="en-US" smtClean="0"/>
-              <a:t>8/10/21</a:t>
+              <a:t>8/10/2021</a:t>
             </a:fld>
             <a:endParaRPr lang="en-US"/>
           </a:p>
@@ -2462,7 +2462,7 @@
           <a:lstStyle/>
           <a:p>
             <a:r>
-              <a:rPr lang="en-US"/>
+              <a:rPr lang="en-US" smtClean="0"/>
               <a:t>Click to edit Master title style</a:t>
             </a:r>
             <a:endParaRPr lang="en-US" dirty="0"/>
@@ -2496,35 +2496,35 @@
           <a:p>
             <a:pPr lvl="0"/>
             <a:r>
-              <a:rPr lang="en-US"/>
+              <a:rPr lang="en-US" smtClean="0"/>
               <a:t>Edit Master text styles</a:t>
             </a:r>
           </a:p>
           <a:p>
             <a:pPr lvl="1"/>
             <a:r>
-              <a:rPr lang="en-US"/>
+              <a:rPr lang="en-US" smtClean="0"/>
               <a:t>Second level</a:t>
             </a:r>
           </a:p>
           <a:p>
             <a:pPr lvl="2"/>
             <a:r>
-              <a:rPr lang="en-US"/>
+              <a:rPr lang="en-US" smtClean="0"/>
               <a:t>Third level</a:t>
             </a:r>
           </a:p>
           <a:p>
             <a:pPr lvl="3"/>
             <a:r>
-              <a:rPr lang="en-US"/>
+              <a:rPr lang="en-US" smtClean="0"/>
               <a:t>Fourth level</a:t>
             </a:r>
           </a:p>
           <a:p>
             <a:pPr lvl="4"/>
             <a:r>
-              <a:rPr lang="en-US"/>
+              <a:rPr lang="en-US" smtClean="0"/>
               <a:t>Fifth level</a:t>
             </a:r>
             <a:endParaRPr lang="en-US" dirty="0"/>
@@ -2566,7 +2566,7 @@
           <a:p>
             <a:fld id="{C1413EED-5722-7C4B-AAEA-A5EA7F954977}" type="datetimeFigureOut">
               <a:rPr lang="en-US" smtClean="0"/>
-              <a:t>8/10/21</a:t>
+              <a:t>8/10/2021</a:t>
             </a:fld>
             <a:endParaRPr lang="en-US"/>
           </a:p>
@@ -3343,7 +3343,17 @@
                 <a:latin typeface="Arial" panose="020B0604020202020204" pitchFamily="34" charset="0"/>
                 <a:cs typeface="Arial" panose="020B0604020202020204" pitchFamily="34" charset="0"/>
               </a:rPr>
-              <a:t>Availability Zone 1</a:t>
+              <a:t>Availability </a:t>
+            </a:r>
+            <a:r>
+              <a:rPr lang="en-US" sz="1200" smtClean="0">
+                <a:solidFill>
+                  <a:srgbClr val="5B9CD5"/>
+                </a:solidFill>
+                <a:latin typeface="Arial" panose="020B0604020202020204" pitchFamily="34" charset="0"/>
+                <a:cs typeface="Arial" panose="020B0604020202020204" pitchFamily="34" charset="0"/>
+              </a:rPr>
+              <a:t>Zone 1</a:t>
             </a:r>
             <a:endParaRPr lang="en-US" sz="1200" dirty="0">
               <a:solidFill>
@@ -4288,10 +4298,20 @@
                 <a:latin typeface="Arial" panose="020B0604020202020204" pitchFamily="34" charset="0"/>
                 <a:cs typeface="Arial" panose="020B0604020202020204" pitchFamily="34" charset="0"/>
               </a:rPr>
-              <a:t> for</a:t>
+              <a:t> </a:t>
+            </a:r>
+            <a:r>
+              <a:rPr lang="en-US" sz="1200" smtClean="0">
+                <a:solidFill>
+                  <a:srgbClr val="5A6B86"/>
+                </a:solidFill>
+                <a:latin typeface="Arial" panose="020B0604020202020204" pitchFamily="34" charset="0"/>
+                <a:cs typeface="Arial" panose="020B0604020202020204" pitchFamily="34" charset="0"/>
+              </a:rPr>
+              <a:t>for</a:t>
             </a:r>
             <a:br>
-              <a:rPr lang="en-US" sz="1200">
+              <a:rPr lang="en-US" sz="1200" smtClean="0">
                 <a:solidFill>
                   <a:srgbClr val="5A6B86"/>
                 </a:solidFill>
@@ -4300,7 +4320,7 @@
               </a:rPr>
             </a:br>
             <a:r>
-              <a:rPr lang="en-US" sz="1200">
+              <a:rPr lang="en-US" sz="1200" smtClean="0">
                 <a:solidFill>
                   <a:srgbClr val="5A6B86"/>
                 </a:solidFill>
@@ -5515,7 +5535,7 @@
           <a:p>
             <a:pPr algn="ctr" eaLnBrk="1" hangingPunct="1"/>
             <a:r>
-              <a:rPr lang="en-US" altLang="en-US" sz="1100">
+              <a:rPr lang="en-US" altLang="en-US" sz="1100" smtClean="0">
                 <a:latin typeface="Arial" panose="020B0604020202020204" pitchFamily="34" charset="0"/>
                 <a:ea typeface="Amazon Ember" panose="020B0603020204020204" pitchFamily="34" charset="0"/>
                 <a:cs typeface="Arial" panose="020B0604020202020204" pitchFamily="34" charset="0"/>
@@ -6031,7 +6051,17 @@
                 <a:latin typeface="Arial" panose="020B0604020202020204" pitchFamily="34" charset="0"/>
                 <a:cs typeface="Arial" panose="020B0604020202020204" pitchFamily="34" charset="0"/>
               </a:rPr>
-              <a:t>Connected dataset</a:t>
+              <a:t>Connected </a:t>
+            </a:r>
+            <a:r>
+              <a:rPr lang="en-US" sz="1200" smtClean="0">
+                <a:solidFill>
+                  <a:srgbClr val="5A6B86"/>
+                </a:solidFill>
+                <a:latin typeface="Arial" panose="020B0604020202020204" pitchFamily="34" charset="0"/>
+                <a:cs typeface="Arial" panose="020B0604020202020204" pitchFamily="34" charset="0"/>
+              </a:rPr>
+              <a:t>dataset</a:t>
             </a:r>
             <a:endParaRPr lang="en-US" sz="1200" dirty="0">
               <a:solidFill>
@@ -6339,7 +6369,7 @@
         </p:nvSpPr>
         <p:spPr bwMode="auto">
           <a:xfrm>
-            <a:off x="12423769" y="6983730"/>
+            <a:off x="12444089" y="6877050"/>
             <a:ext cx="1005840" cy="274320"/>
           </a:xfrm>
           <a:prstGeom prst="rect">
@@ -6474,7 +6504,7 @@
           <a:p>
             <a:pPr algn="ctr" eaLnBrk="1" hangingPunct="1"/>
             <a:r>
-              <a:rPr lang="en-US" altLang="en-US" sz="1200">
+              <a:rPr lang="en-US" altLang="en-US" sz="1200" smtClean="0">
                 <a:latin typeface="Arial" panose="020B0604020202020204" pitchFamily="34" charset="0"/>
                 <a:ea typeface="Amazon Ember" panose="020B0603020204020204" pitchFamily="34" charset="0"/>
                 <a:cs typeface="Arial" panose="020B0604020202020204" pitchFamily="34" charset="0"/>
@@ -6518,7 +6548,7 @@
         </p:blipFill>
         <p:spPr bwMode="auto">
           <a:xfrm>
-            <a:off x="1554480" y="3566160"/>
+            <a:off x="1554480" y="3558540"/>
             <a:ext cx="469900" cy="469900"/>
           </a:xfrm>
           <a:prstGeom prst="rect">
@@ -6565,7 +6595,7 @@
         </p:nvSpPr>
         <p:spPr bwMode="auto">
           <a:xfrm>
-            <a:off x="1485162" y="4127500"/>
+            <a:off x="1515642" y="4030980"/>
             <a:ext cx="548640" cy="274320"/>
           </a:xfrm>
           <a:prstGeom prst="rect">
@@ -6916,9 +6946,9 @@
           <p:nvPr/>
         </p:nvCxnSpPr>
         <p:spPr>
-          <a:xfrm flipV="1">
-            <a:off x="2024380" y="3794760"/>
-            <a:ext cx="627380" cy="6350"/>
+          <a:xfrm>
+            <a:off x="2024380" y="3793490"/>
+            <a:ext cx="627380" cy="1270"/>
           </a:xfrm>
           <a:prstGeom prst="straightConnector1">
             <a:avLst/>
@@ -7437,7 +7467,27 @@
                 <a:latin typeface="Arial" panose="020B0604020202020204" pitchFamily="34" charset="0"/>
                 <a:cs typeface="Arial" panose="020B0604020202020204" pitchFamily="34" charset="0"/>
               </a:rPr>
-              <a:t>Availability Zone 1</a:t>
+              <a:t>Availability </a:t>
+            </a:r>
+            <a:r>
+              <a:rPr lang="en-US" sz="1200" smtClean="0">
+                <a:solidFill>
+                  <a:srgbClr val="5B9CD5"/>
+                </a:solidFill>
+                <a:latin typeface="Arial" panose="020B0604020202020204" pitchFamily="34" charset="0"/>
+                <a:cs typeface="Arial" panose="020B0604020202020204" pitchFamily="34" charset="0"/>
+              </a:rPr>
+              <a:t>Zone </a:t>
+            </a:r>
+            <a:r>
+              <a:rPr lang="en-US" sz="1200" smtClean="0">
+                <a:solidFill>
+                  <a:srgbClr val="5B9CD5"/>
+                </a:solidFill>
+                <a:latin typeface="Arial" panose="020B0604020202020204" pitchFamily="34" charset="0"/>
+                <a:cs typeface="Arial" panose="020B0604020202020204" pitchFamily="34" charset="0"/>
+              </a:rPr>
+              <a:t>2</a:t>
             </a:r>
             <a:endParaRPr lang="en-US" sz="1200" dirty="0">
               <a:solidFill>
@@ -9172,7 +9222,7 @@
           <a:p>
             <a:pPr algn="ctr" eaLnBrk="1" hangingPunct="1"/>
             <a:r>
-              <a:rPr lang="en-US" altLang="en-US" sz="1100">
+              <a:rPr lang="en-US" altLang="en-US" sz="1100" smtClean="0">
                 <a:latin typeface="Arial" panose="020B0604020202020204" pitchFamily="34" charset="0"/>
                 <a:ea typeface="Amazon Ember" panose="020B0603020204020204" pitchFamily="34" charset="0"/>
                 <a:cs typeface="Arial" panose="020B0604020202020204" pitchFamily="34" charset="0"/>
@@ -9544,8 +9594,8 @@
         </p:nvSpPr>
         <p:spPr bwMode="auto">
           <a:xfrm>
-            <a:off x="12189771" y="7863840"/>
-            <a:ext cx="1493838" cy="430887"/>
+            <a:off x="12437421" y="7867649"/>
+            <a:ext cx="1005840" cy="274320"/>
           </a:xfrm>
           <a:prstGeom prst="rect">
             <a:avLst/>
@@ -10001,7 +10051,7 @@
           <p:cNvPr id="76" name="Graphic 11">
             <a:extLst>
               <a:ext uri="{FF2B5EF4-FFF2-40B4-BE49-F238E27FC236}">
-                <a16:creationId xmlns:a16="http://schemas.microsoft.com/office/drawing/2014/main" id="{AC44B3A7-ABE4-3A40-BE70-307D9A526A5A}"/>
+                <a16:creationId xmlns:a16="http://schemas.microsoft.com/office/drawing/2014/main" id="{2AB3466B-8F9E-AF49-9E8C-DEC1264882DE}"/>
               </a:ext>
             </a:extLst>
           </p:cNvPr>
@@ -10025,7 +10075,7 @@
         </p:blipFill>
         <p:spPr bwMode="auto">
           <a:xfrm>
-            <a:off x="12673330" y="6329754"/>
+            <a:off x="12710160" y="6400800"/>
             <a:ext cx="469900" cy="469900"/>
           </a:xfrm>
           <a:prstGeom prst="rect">

</xml_diff>

<commit_message>
Production doc builds - 2021/08/24 22:15:12 UTC
</commit_message>
<xml_diff>
--- a/docs/images/apache-superset-architecture-diagram.pptx
+++ b/docs/images/apache-superset-architecture-diagram.pptx
@@ -243,7 +243,7 @@
           <a:p>
             <a:fld id="{C1413EED-5722-7C4B-AAEA-A5EA7F954977}" type="datetimeFigureOut">
               <a:rPr lang="en-US" smtClean="0"/>
-              <a:t>8/10/2021</a:t>
+              <a:t>8/24/2021</a:t>
             </a:fld>
             <a:endParaRPr lang="en-US"/>
           </a:p>
@@ -413,7 +413,7 @@
           <a:p>
             <a:fld id="{C1413EED-5722-7C4B-AAEA-A5EA7F954977}" type="datetimeFigureOut">
               <a:rPr lang="en-US" smtClean="0"/>
-              <a:t>8/10/2021</a:t>
+              <a:t>8/24/2021</a:t>
             </a:fld>
             <a:endParaRPr lang="en-US"/>
           </a:p>
@@ -593,7 +593,7 @@
           <a:p>
             <a:fld id="{C1413EED-5722-7C4B-AAEA-A5EA7F954977}" type="datetimeFigureOut">
               <a:rPr lang="en-US" smtClean="0"/>
-              <a:t>8/10/2021</a:t>
+              <a:t>8/24/2021</a:t>
             </a:fld>
             <a:endParaRPr lang="en-US"/>
           </a:p>
@@ -763,7 +763,7 @@
           <a:p>
             <a:fld id="{C1413EED-5722-7C4B-AAEA-A5EA7F954977}" type="datetimeFigureOut">
               <a:rPr lang="en-US" smtClean="0"/>
-              <a:t>8/10/2021</a:t>
+              <a:t>8/24/2021</a:t>
             </a:fld>
             <a:endParaRPr lang="en-US"/>
           </a:p>
@@ -1007,7 +1007,7 @@
           <a:p>
             <a:fld id="{C1413EED-5722-7C4B-AAEA-A5EA7F954977}" type="datetimeFigureOut">
               <a:rPr lang="en-US" smtClean="0"/>
-              <a:t>8/10/2021</a:t>
+              <a:t>8/24/2021</a:t>
             </a:fld>
             <a:endParaRPr lang="en-US"/>
           </a:p>
@@ -1239,7 +1239,7 @@
           <a:p>
             <a:fld id="{C1413EED-5722-7C4B-AAEA-A5EA7F954977}" type="datetimeFigureOut">
               <a:rPr lang="en-US" smtClean="0"/>
-              <a:t>8/10/2021</a:t>
+              <a:t>8/24/2021</a:t>
             </a:fld>
             <a:endParaRPr lang="en-US"/>
           </a:p>
@@ -1606,7 +1606,7 @@
           <a:p>
             <a:fld id="{C1413EED-5722-7C4B-AAEA-A5EA7F954977}" type="datetimeFigureOut">
               <a:rPr lang="en-US" smtClean="0"/>
-              <a:t>8/10/2021</a:t>
+              <a:t>8/24/2021</a:t>
             </a:fld>
             <a:endParaRPr lang="en-US"/>
           </a:p>
@@ -1724,7 +1724,7 @@
           <a:p>
             <a:fld id="{C1413EED-5722-7C4B-AAEA-A5EA7F954977}" type="datetimeFigureOut">
               <a:rPr lang="en-US" smtClean="0"/>
-              <a:t>8/10/2021</a:t>
+              <a:t>8/24/2021</a:t>
             </a:fld>
             <a:endParaRPr lang="en-US"/>
           </a:p>
@@ -1819,7 +1819,7 @@
           <a:p>
             <a:fld id="{C1413EED-5722-7C4B-AAEA-A5EA7F954977}" type="datetimeFigureOut">
               <a:rPr lang="en-US" smtClean="0"/>
-              <a:t>8/10/2021</a:t>
+              <a:t>8/24/2021</a:t>
             </a:fld>
             <a:endParaRPr lang="en-US"/>
           </a:p>
@@ -2096,7 +2096,7 @@
           <a:p>
             <a:fld id="{C1413EED-5722-7C4B-AAEA-A5EA7F954977}" type="datetimeFigureOut">
               <a:rPr lang="en-US" smtClean="0"/>
-              <a:t>8/10/2021</a:t>
+              <a:t>8/24/2021</a:t>
             </a:fld>
             <a:endParaRPr lang="en-US"/>
           </a:p>
@@ -2353,7 +2353,7 @@
           <a:p>
             <a:fld id="{C1413EED-5722-7C4B-AAEA-A5EA7F954977}" type="datetimeFigureOut">
               <a:rPr lang="en-US" smtClean="0"/>
-              <a:t>8/10/2021</a:t>
+              <a:t>8/24/2021</a:t>
             </a:fld>
             <a:endParaRPr lang="en-US"/>
           </a:p>
@@ -2566,7 +2566,7 @@
           <a:p>
             <a:fld id="{C1413EED-5722-7C4B-AAEA-A5EA7F954977}" type="datetimeFigureOut">
               <a:rPr lang="en-US" smtClean="0"/>
-              <a:t>8/10/2021</a:t>
+              <a:t>8/24/2021</a:t>
             </a:fld>
             <a:endParaRPr lang="en-US"/>
           </a:p>
@@ -3052,7 +3052,7 @@
         <p:spPr>
           <a:xfrm>
             <a:off x="2317531" y="2517167"/>
-            <a:ext cx="11521440" cy="7498080"/>
+            <a:ext cx="10607040" cy="7498080"/>
           </a:xfrm>
           <a:prstGeom prst="rect">
             <a:avLst/>
@@ -5994,367 +5994,6 @@
       </p:sp>
       <p:sp>
         <p:nvSpPr>
-          <p:cNvPr id="50" name="Rectangle 49">
-            <a:extLst>
-              <a:ext uri="{FF2B5EF4-FFF2-40B4-BE49-F238E27FC236}">
-                <a16:creationId xmlns:a16="http://schemas.microsoft.com/office/drawing/2014/main" id="{4834830D-9998-614D-9E34-9376B3691430}"/>
-              </a:ext>
-            </a:extLst>
-          </p:cNvPr>
-          <p:cNvSpPr/>
-          <p:nvPr/>
-        </p:nvSpPr>
-        <p:spPr>
-          <a:xfrm>
-            <a:off x="12161520" y="3200400"/>
-            <a:ext cx="1463040" cy="6400800"/>
-          </a:xfrm>
-          <a:prstGeom prst="rect">
-            <a:avLst/>
-          </a:prstGeom>
-          <a:noFill/>
-          <a:ln w="12700">
-            <a:solidFill>
-              <a:srgbClr val="5A6B86"/>
-            </a:solidFill>
-            <a:prstDash val="dash"/>
-          </a:ln>
-        </p:spPr>
-        <p:style>
-          <a:lnRef idx="2">
-            <a:schemeClr val="accent1">
-              <a:shade val="50000"/>
-            </a:schemeClr>
-          </a:lnRef>
-          <a:fillRef idx="1">
-            <a:schemeClr val="accent1"/>
-          </a:fillRef>
-          <a:effectRef idx="0">
-            <a:schemeClr val="accent1"/>
-          </a:effectRef>
-          <a:fontRef idx="minor">
-            <a:schemeClr val="lt1"/>
-          </a:fontRef>
-        </p:style>
-        <p:txBody>
-          <a:bodyPr tIns="91440"/>
-          <a:lstStyle/>
-          <a:p>
-            <a:pPr algn="ctr">
-              <a:defRPr/>
-            </a:pPr>
-            <a:r>
-              <a:rPr lang="en-US" sz="1200">
-                <a:solidFill>
-                  <a:srgbClr val="5A6B86"/>
-                </a:solidFill>
-                <a:latin typeface="Arial" panose="020B0604020202020204" pitchFamily="34" charset="0"/>
-                <a:cs typeface="Arial" panose="020B0604020202020204" pitchFamily="34" charset="0"/>
-              </a:rPr>
-              <a:t>Connected </a:t>
-            </a:r>
-            <a:r>
-              <a:rPr lang="en-US" sz="1200" smtClean="0">
-                <a:solidFill>
-                  <a:srgbClr val="5A6B86"/>
-                </a:solidFill>
-                <a:latin typeface="Arial" panose="020B0604020202020204" pitchFamily="34" charset="0"/>
-                <a:cs typeface="Arial" panose="020B0604020202020204" pitchFamily="34" charset="0"/>
-              </a:rPr>
-              <a:t>dataset</a:t>
-            </a:r>
-            <a:endParaRPr lang="en-US" sz="1200" dirty="0">
-              <a:solidFill>
-                <a:srgbClr val="5A6B86"/>
-              </a:solidFill>
-              <a:latin typeface="Arial" panose="020B0604020202020204" pitchFamily="34" charset="0"/>
-              <a:cs typeface="Arial" panose="020B0604020202020204" pitchFamily="34" charset="0"/>
-            </a:endParaRPr>
-          </a:p>
-        </p:txBody>
-      </p:sp>
-      <p:sp>
-        <p:nvSpPr>
-          <p:cNvPr id="51" name="TextBox 17">
-            <a:extLst>
-              <a:ext uri="{FF2B5EF4-FFF2-40B4-BE49-F238E27FC236}">
-                <a16:creationId xmlns:a16="http://schemas.microsoft.com/office/drawing/2014/main" id="{E26618A6-8230-0245-B8C5-7EA606C28883}"/>
-              </a:ext>
-            </a:extLst>
-          </p:cNvPr>
-          <p:cNvSpPr txBox="1">
-            <a:spLocks noChangeArrowheads="1"/>
-          </p:cNvSpPr>
-          <p:nvPr/>
-        </p:nvSpPr>
-        <p:spPr bwMode="auto">
-          <a:xfrm>
-            <a:off x="12275354" y="4480560"/>
-            <a:ext cx="1280160" cy="276999"/>
-          </a:xfrm>
-          <a:prstGeom prst="rect">
-            <a:avLst/>
-          </a:prstGeom>
-          <a:noFill/>
-          <a:ln>
-            <a:noFill/>
-          </a:ln>
-          <a:extLst>
-            <a:ext uri="{909E8E84-426E-40DD-AFC4-6F175D3DCCD1}">
-              <a14:hiddenFill xmlns:a14="http://schemas.microsoft.com/office/drawing/2010/main">
-                <a:solidFill>
-                  <a:srgbClr val="FFFFFF"/>
-                </a:solidFill>
-              </a14:hiddenFill>
-            </a:ext>
-            <a:ext uri="{91240B29-F687-4F45-9708-019B960494DF}">
-              <a14:hiddenLine xmlns:a14="http://schemas.microsoft.com/office/drawing/2010/main" w="9525">
-                <a:solidFill>
-                  <a:srgbClr val="000000"/>
-                </a:solidFill>
-                <a:miter lim="800000"/>
-                <a:headEnd/>
-                <a:tailEnd/>
-              </a14:hiddenLine>
-            </a:ext>
-          </a:extLst>
-        </p:spPr>
-        <p:style>
-          <a:lnRef idx="0">
-            <a:scrgbClr r="0" g="0" b="0"/>
-          </a:lnRef>
-          <a:fillRef idx="0">
-            <a:scrgbClr r="0" g="0" b="0"/>
-          </a:fillRef>
-          <a:effectRef idx="0">
-            <a:scrgbClr r="0" g="0" b="0"/>
-          </a:effectRef>
-          <a:fontRef idx="major"/>
-        </p:style>
-        <p:txBody>
-          <a:bodyPr>
-            <a:spAutoFit/>
-          </a:bodyPr>
-          <a:lstStyle>
-            <a:lvl1pPr>
-              <a:defRPr>
-                <a:latin typeface="+mj-lt"/>
-                <a:ea typeface="+mj-ea"/>
-                <a:cs typeface="+mj-cs"/>
-              </a:defRPr>
-            </a:lvl1pPr>
-            <a:lvl2pPr>
-              <a:defRPr>
-                <a:latin typeface="+mj-lt"/>
-                <a:ea typeface="+mj-ea"/>
-                <a:cs typeface="+mj-cs"/>
-              </a:defRPr>
-            </a:lvl2pPr>
-            <a:lvl3pPr>
-              <a:defRPr>
-                <a:latin typeface="+mj-lt"/>
-                <a:ea typeface="+mj-ea"/>
-                <a:cs typeface="+mj-cs"/>
-              </a:defRPr>
-            </a:lvl3pPr>
-            <a:lvl4pPr>
-              <a:defRPr>
-                <a:latin typeface="+mj-lt"/>
-                <a:ea typeface="+mj-ea"/>
-                <a:cs typeface="+mj-cs"/>
-              </a:defRPr>
-            </a:lvl4pPr>
-            <a:lvl5pPr>
-              <a:defRPr>
-                <a:latin typeface="+mj-lt"/>
-                <a:ea typeface="+mj-ea"/>
-                <a:cs typeface="+mj-cs"/>
-              </a:defRPr>
-            </a:lvl5pPr>
-            <a:lvl6pPr>
-              <a:defRPr>
-                <a:latin typeface="+mj-lt"/>
-                <a:ea typeface="+mj-ea"/>
-                <a:cs typeface="+mj-cs"/>
-              </a:defRPr>
-            </a:lvl6pPr>
-            <a:lvl7pPr>
-              <a:defRPr>
-                <a:latin typeface="+mj-lt"/>
-                <a:ea typeface="+mj-ea"/>
-                <a:cs typeface="+mj-cs"/>
-              </a:defRPr>
-            </a:lvl7pPr>
-            <a:lvl8pPr>
-              <a:defRPr>
-                <a:latin typeface="+mj-lt"/>
-                <a:ea typeface="+mj-ea"/>
-                <a:cs typeface="+mj-cs"/>
-              </a:defRPr>
-            </a:lvl8pPr>
-            <a:lvl9pPr>
-              <a:defRPr>
-                <a:latin typeface="+mj-lt"/>
-                <a:ea typeface="+mj-ea"/>
-                <a:cs typeface="+mj-cs"/>
-              </a:defRPr>
-            </a:lvl9pPr>
-          </a:lstStyle>
-          <a:p>
-            <a:pPr algn="ctr" eaLnBrk="1" hangingPunct="1"/>
-            <a:r>
-              <a:rPr lang="en-US" altLang="en-US" sz="1200" dirty="0">
-                <a:latin typeface="Arial" panose="020B0604020202020204" pitchFamily="34" charset="0"/>
-                <a:ea typeface="Amazon Ember" panose="020B0603020204020204" pitchFamily="34" charset="0"/>
-                <a:cs typeface="Arial" panose="020B0604020202020204" pitchFamily="34" charset="0"/>
-              </a:rPr>
-              <a:t>Amazon Athena</a:t>
-            </a:r>
-          </a:p>
-        </p:txBody>
-      </p:sp>
-      <p:sp>
-        <p:nvSpPr>
-          <p:cNvPr id="54" name="TextBox 34">
-            <a:extLst>
-              <a:ext uri="{FF2B5EF4-FFF2-40B4-BE49-F238E27FC236}">
-                <a16:creationId xmlns:a16="http://schemas.microsoft.com/office/drawing/2014/main" id="{AFF0D430-93EC-584A-80B1-3E15800B7D3C}"/>
-              </a:ext>
-            </a:extLst>
-          </p:cNvPr>
-          <p:cNvSpPr txBox="1">
-            <a:spLocks noChangeArrowheads="1"/>
-          </p:cNvSpPr>
-          <p:nvPr/>
-        </p:nvSpPr>
-        <p:spPr bwMode="auto">
-          <a:xfrm>
-            <a:off x="12228189" y="5760720"/>
-            <a:ext cx="1371600" cy="276999"/>
-          </a:xfrm>
-          <a:prstGeom prst="rect">
-            <a:avLst/>
-          </a:prstGeom>
-          <a:noFill/>
-          <a:ln>
-            <a:noFill/>
-          </a:ln>
-          <a:extLst>
-            <a:ext uri="{909E8E84-426E-40DD-AFC4-6F175D3DCCD1}">
-              <a14:hiddenFill xmlns:a14="http://schemas.microsoft.com/office/drawing/2010/main">
-                <a:solidFill>
-                  <a:srgbClr val="FFFFFF"/>
-                </a:solidFill>
-              </a14:hiddenFill>
-            </a:ext>
-            <a:ext uri="{91240B29-F687-4F45-9708-019B960494DF}">
-              <a14:hiddenLine xmlns:a14="http://schemas.microsoft.com/office/drawing/2010/main" w="9525">
-                <a:solidFill>
-                  <a:srgbClr val="000000"/>
-                </a:solidFill>
-                <a:miter lim="800000"/>
-                <a:headEnd/>
-                <a:tailEnd/>
-              </a14:hiddenLine>
-            </a:ext>
-          </a:extLst>
-        </p:spPr>
-        <p:style>
-          <a:lnRef idx="0">
-            <a:scrgbClr r="0" g="0" b="0"/>
-          </a:lnRef>
-          <a:fillRef idx="0">
-            <a:scrgbClr r="0" g="0" b="0"/>
-          </a:fillRef>
-          <a:effectRef idx="0">
-            <a:scrgbClr r="0" g="0" b="0"/>
-          </a:effectRef>
-          <a:fontRef idx="major"/>
-        </p:style>
-        <p:txBody>
-          <a:bodyPr wrap="square">
-            <a:spAutoFit/>
-          </a:bodyPr>
-          <a:lstStyle>
-            <a:lvl1pPr>
-              <a:defRPr>
-                <a:latin typeface="+mj-lt"/>
-                <a:ea typeface="+mj-ea"/>
-                <a:cs typeface="+mj-cs"/>
-              </a:defRPr>
-            </a:lvl1pPr>
-            <a:lvl2pPr>
-              <a:defRPr>
-                <a:latin typeface="+mj-lt"/>
-                <a:ea typeface="+mj-ea"/>
-                <a:cs typeface="+mj-cs"/>
-              </a:defRPr>
-            </a:lvl2pPr>
-            <a:lvl3pPr>
-              <a:defRPr>
-                <a:latin typeface="+mj-lt"/>
-                <a:ea typeface="+mj-ea"/>
-                <a:cs typeface="+mj-cs"/>
-              </a:defRPr>
-            </a:lvl3pPr>
-            <a:lvl4pPr>
-              <a:defRPr>
-                <a:latin typeface="+mj-lt"/>
-                <a:ea typeface="+mj-ea"/>
-                <a:cs typeface="+mj-cs"/>
-              </a:defRPr>
-            </a:lvl4pPr>
-            <a:lvl5pPr>
-              <a:defRPr>
-                <a:latin typeface="+mj-lt"/>
-                <a:ea typeface="+mj-ea"/>
-                <a:cs typeface="+mj-cs"/>
-              </a:defRPr>
-            </a:lvl5pPr>
-            <a:lvl6pPr>
-              <a:defRPr>
-                <a:latin typeface="+mj-lt"/>
-                <a:ea typeface="+mj-ea"/>
-                <a:cs typeface="+mj-cs"/>
-              </a:defRPr>
-            </a:lvl6pPr>
-            <a:lvl7pPr>
-              <a:defRPr>
-                <a:latin typeface="+mj-lt"/>
-                <a:ea typeface="+mj-ea"/>
-                <a:cs typeface="+mj-cs"/>
-              </a:defRPr>
-            </a:lvl7pPr>
-            <a:lvl8pPr>
-              <a:defRPr>
-                <a:latin typeface="+mj-lt"/>
-                <a:ea typeface="+mj-ea"/>
-                <a:cs typeface="+mj-cs"/>
-              </a:defRPr>
-            </a:lvl8pPr>
-            <a:lvl9pPr>
-              <a:defRPr>
-                <a:latin typeface="+mj-lt"/>
-                <a:ea typeface="+mj-ea"/>
-                <a:cs typeface="+mj-cs"/>
-              </a:defRPr>
-            </a:lvl9pPr>
-          </a:lstStyle>
-          <a:p>
-            <a:pPr algn="ctr" eaLnBrk="1" hangingPunct="1"/>
-            <a:r>
-              <a:rPr lang="en-US" altLang="en-US" sz="1200" dirty="0">
-                <a:latin typeface="Arial" panose="020B0604020202020204" pitchFamily="34" charset="0"/>
-                <a:ea typeface="Amazon Ember" panose="020B0603020204020204" pitchFamily="34" charset="0"/>
-                <a:cs typeface="Arial" panose="020B0604020202020204" pitchFamily="34" charset="0"/>
-              </a:rPr>
-              <a:t>Amazon Redshift</a:t>
-            </a:r>
-          </a:p>
-        </p:txBody>
-      </p:sp>
-      <p:sp>
-        <p:nvSpPr>
           <p:cNvPr id="60" name="TextBox 8">
             <a:extLst>
               <a:ext uri="{FF2B5EF4-FFF2-40B4-BE49-F238E27FC236}">
@@ -6369,8 +6008,8 @@
         </p:nvSpPr>
         <p:spPr bwMode="auto">
           <a:xfrm>
-            <a:off x="12444089" y="6877050"/>
-            <a:ext cx="1005840" cy="274320"/>
+            <a:off x="11466830" y="6635182"/>
+            <a:ext cx="1463040" cy="274320"/>
           </a:xfrm>
           <a:prstGeom prst="rect">
             <a:avLst/>
@@ -6400,7 +6039,7 @@
           </a:extLst>
         </p:spPr>
         <p:txBody>
-          <a:bodyPr>
+          <a:bodyPr wrap="square">
             <a:spAutoFit/>
           </a:bodyPr>
           <a:lstStyle>
@@ -6509,7 +6148,15 @@
                 <a:ea typeface="Amazon Ember" panose="020B0603020204020204" pitchFamily="34" charset="0"/>
                 <a:cs typeface="Arial" panose="020B0604020202020204" pitchFamily="34" charset="0"/>
               </a:rPr>
-              <a:t>ClickHouse</a:t>
+              <a:t>Supported </a:t>
+            </a:r>
+            <a:r>
+              <a:rPr lang="en-US" altLang="en-US" sz="1200" smtClean="0">
+                <a:latin typeface="Arial" panose="020B0604020202020204" pitchFamily="34" charset="0"/>
+                <a:ea typeface="Amazon Ember" panose="020B0603020204020204" pitchFamily="34" charset="0"/>
+                <a:cs typeface="Arial" panose="020B0604020202020204" pitchFamily="34" charset="0"/>
+              </a:rPr>
+              <a:t>database systems</a:t>
             </a:r>
             <a:endParaRPr lang="en-US" altLang="en-US" sz="1200" dirty="0">
               <a:latin typeface="Arial" panose="020B0604020202020204" pitchFamily="34" charset="0"/>
@@ -7035,14 +6682,14 @@
           <p:cNvCxnSpPr>
             <a:cxnSpLocks/>
             <a:stCxn id="9" idx="3"/>
-            <a:endCxn id="50" idx="1"/>
+            <a:endCxn id="76" idx="1"/>
           </p:cNvCxnSpPr>
           <p:nvPr/>
         </p:nvCxnSpPr>
         <p:spPr>
-          <a:xfrm>
-            <a:off x="11430000" y="6400800"/>
-            <a:ext cx="731520" cy="0"/>
+          <a:xfrm flipV="1">
+            <a:off x="11430000" y="6396845"/>
+            <a:ext cx="534195" cy="3955"/>
           </a:xfrm>
           <a:prstGeom prst="straightConnector1">
             <a:avLst/>
@@ -7477,17 +7124,7 @@
                 <a:latin typeface="Arial" panose="020B0604020202020204" pitchFamily="34" charset="0"/>
                 <a:cs typeface="Arial" panose="020B0604020202020204" pitchFamily="34" charset="0"/>
               </a:rPr>
-              <a:t>Zone </a:t>
-            </a:r>
-            <a:r>
-              <a:rPr lang="en-US" sz="1200" smtClean="0">
-                <a:solidFill>
-                  <a:srgbClr val="5B9CD5"/>
-                </a:solidFill>
-                <a:latin typeface="Arial" panose="020B0604020202020204" pitchFamily="34" charset="0"/>
-                <a:cs typeface="Arial" panose="020B0604020202020204" pitchFamily="34" charset="0"/>
-              </a:rPr>
-              <a:t>2</a:t>
+              <a:t>Zone 2</a:t>
             </a:r>
             <a:endParaRPr lang="en-US" sz="1200" dirty="0">
               <a:solidFill>
@@ -7908,126 +7545,6 @@
       </p:sp>
       <p:pic>
         <p:nvPicPr>
-          <p:cNvPr id="117" name="Graphic 14">
-            <a:extLst>
-              <a:ext uri="{FF2B5EF4-FFF2-40B4-BE49-F238E27FC236}">
-                <a16:creationId xmlns:a16="http://schemas.microsoft.com/office/drawing/2014/main" id="{03CFE0DA-7222-7240-9D26-C830D958A3CE}"/>
-              </a:ext>
-            </a:extLst>
-          </p:cNvPr>
-          <p:cNvPicPr>
-            <a:picLocks noChangeAspect="1" noChangeArrowheads="1"/>
-          </p:cNvPicPr>
-          <p:nvPr/>
-        </p:nvPicPr>
-        <p:blipFill>
-          <a:blip r:embed="rId13">
-            <a:extLst>
-              <a:ext uri="{28A0092B-C50C-407E-A947-70E740481C1C}">
-                <a14:useLocalDpi xmlns:a14="http://schemas.microsoft.com/office/drawing/2010/main" val="0"/>
-              </a:ext>
-            </a:extLst>
-          </a:blip>
-          <a:srcRect/>
-          <a:stretch>
-            <a:fillRect/>
-          </a:stretch>
-        </p:blipFill>
-        <p:spPr bwMode="auto">
-          <a:xfrm>
-            <a:off x="12527280" y="3657600"/>
-            <a:ext cx="762000" cy="762000"/>
-          </a:xfrm>
-          <a:prstGeom prst="rect">
-            <a:avLst/>
-          </a:prstGeom>
-          <a:noFill/>
-          <a:ln>
-            <a:noFill/>
-          </a:ln>
-          <a:extLst>
-            <a:ext uri="{909E8E84-426E-40DD-AFC4-6F175D3DCCD1}">
-              <a14:hiddenFill xmlns:a14="http://schemas.microsoft.com/office/drawing/2010/main">
-                <a:solidFill>
-                  <a:srgbClr val="FFFFFF"/>
-                </a:solidFill>
-              </a14:hiddenFill>
-            </a:ext>
-            <a:ext uri="{91240B29-F687-4F45-9708-019B960494DF}">
-              <a14:hiddenLine xmlns:a14="http://schemas.microsoft.com/office/drawing/2010/main" w="9525">
-                <a:solidFill>
-                  <a:srgbClr val="000000"/>
-                </a:solidFill>
-                <a:miter lim="800000"/>
-                <a:headEnd/>
-                <a:tailEnd/>
-              </a14:hiddenLine>
-            </a:ext>
-          </a:extLst>
-        </p:spPr>
-      </p:pic>
-      <p:pic>
-        <p:nvPicPr>
-          <p:cNvPr id="118" name="Graphic 23">
-            <a:extLst>
-              <a:ext uri="{FF2B5EF4-FFF2-40B4-BE49-F238E27FC236}">
-                <a16:creationId xmlns:a16="http://schemas.microsoft.com/office/drawing/2014/main" id="{F1C23086-EC84-CB4E-BB00-6843C7A21B5C}"/>
-              </a:ext>
-            </a:extLst>
-          </p:cNvPr>
-          <p:cNvPicPr>
-            <a:picLocks noChangeAspect="1" noChangeArrowheads="1"/>
-          </p:cNvPicPr>
-          <p:nvPr/>
-        </p:nvPicPr>
-        <p:blipFill>
-          <a:blip r:embed="rId14">
-            <a:extLst>
-              <a:ext uri="{28A0092B-C50C-407E-A947-70E740481C1C}">
-                <a14:useLocalDpi xmlns:a14="http://schemas.microsoft.com/office/drawing/2010/main" val="0"/>
-              </a:ext>
-            </a:extLst>
-          </a:blip>
-          <a:srcRect/>
-          <a:stretch>
-            <a:fillRect/>
-          </a:stretch>
-        </p:blipFill>
-        <p:spPr bwMode="auto">
-          <a:xfrm>
-            <a:off x="12527280" y="4937760"/>
-            <a:ext cx="762000" cy="762000"/>
-          </a:xfrm>
-          <a:prstGeom prst="rect">
-            <a:avLst/>
-          </a:prstGeom>
-          <a:noFill/>
-          <a:ln>
-            <a:noFill/>
-          </a:ln>
-          <a:extLst>
-            <a:ext uri="{909E8E84-426E-40DD-AFC4-6F175D3DCCD1}">
-              <a14:hiddenFill xmlns:a14="http://schemas.microsoft.com/office/drawing/2010/main">
-                <a:solidFill>
-                  <a:srgbClr val="FFFFFF"/>
-                </a:solidFill>
-              </a14:hiddenFill>
-            </a:ext>
-            <a:ext uri="{91240B29-F687-4F45-9708-019B960494DF}">
-              <a14:hiddenLine xmlns:a14="http://schemas.microsoft.com/office/drawing/2010/main" w="9525">
-                <a:solidFill>
-                  <a:srgbClr val="000000"/>
-                </a:solidFill>
-                <a:miter lim="800000"/>
-                <a:headEnd/>
-                <a:tailEnd/>
-              </a14:hiddenLine>
-            </a:ext>
-          </a:extLst>
-        </p:spPr>
-      </p:pic>
-      <p:pic>
-        <p:nvPicPr>
           <p:cNvPr id="119" name="Graphic 38">
             <a:extLst>
               <a:ext uri="{FF2B5EF4-FFF2-40B4-BE49-F238E27FC236}">
@@ -9578,474 +9095,6 @@
           </a:extLst>
         </p:spPr>
       </p:pic>
-      <p:sp>
-        <p:nvSpPr>
-          <p:cNvPr id="133" name="TextBox 8">
-            <a:extLst>
-              <a:ext uri="{FF2B5EF4-FFF2-40B4-BE49-F238E27FC236}">
-                <a16:creationId xmlns:a16="http://schemas.microsoft.com/office/drawing/2014/main" id="{9A51BFEC-955C-E444-A046-8E4A45B6EFDA}"/>
-              </a:ext>
-            </a:extLst>
-          </p:cNvPr>
-          <p:cNvSpPr txBox="1">
-            <a:spLocks noChangeArrowheads="1"/>
-          </p:cNvSpPr>
-          <p:nvPr/>
-        </p:nvSpPr>
-        <p:spPr bwMode="auto">
-          <a:xfrm>
-            <a:off x="12437421" y="7867649"/>
-            <a:ext cx="1005840" cy="274320"/>
-          </a:xfrm>
-          <a:prstGeom prst="rect">
-            <a:avLst/>
-          </a:prstGeom>
-          <a:noFill/>
-          <a:ln>
-            <a:noFill/>
-          </a:ln>
-          <a:extLst>
-            <a:ext uri="{909E8E84-426E-40DD-AFC4-6F175D3DCCD1}">
-              <a14:hiddenFill xmlns:a14="http://schemas.microsoft.com/office/drawing/2010/main">
-                <a:solidFill>
-                  <a:srgbClr val="FFFFFF"/>
-                </a:solidFill>
-              </a14:hiddenFill>
-            </a:ext>
-            <a:ext uri="{91240B29-F687-4F45-9708-019B960494DF}">
-              <a14:hiddenLine xmlns:a14="http://schemas.microsoft.com/office/drawing/2010/main" w="9525">
-                <a:solidFill>
-                  <a:srgbClr val="000000"/>
-                </a:solidFill>
-                <a:miter lim="800000"/>
-                <a:headEnd/>
-                <a:tailEnd/>
-              </a14:hiddenLine>
-            </a:ext>
-          </a:extLst>
-        </p:spPr>
-        <p:txBody>
-          <a:bodyPr>
-            <a:spAutoFit/>
-          </a:bodyPr>
-          <a:lstStyle>
-            <a:lvl1pPr>
-              <a:defRPr>
-                <a:solidFill>
-                  <a:schemeClr val="tx1"/>
-                </a:solidFill>
-                <a:latin typeface="Calibri" panose="020F0502020204030204" pitchFamily="34" charset="0"/>
-              </a:defRPr>
-            </a:lvl1pPr>
-            <a:lvl2pPr marL="742950" indent="-285750">
-              <a:defRPr>
-                <a:solidFill>
-                  <a:schemeClr val="tx1"/>
-                </a:solidFill>
-                <a:latin typeface="Calibri" panose="020F0502020204030204" pitchFamily="34" charset="0"/>
-              </a:defRPr>
-            </a:lvl2pPr>
-            <a:lvl3pPr marL="1143000" indent="-228600">
-              <a:defRPr>
-                <a:solidFill>
-                  <a:schemeClr val="tx1"/>
-                </a:solidFill>
-                <a:latin typeface="Calibri" panose="020F0502020204030204" pitchFamily="34" charset="0"/>
-              </a:defRPr>
-            </a:lvl3pPr>
-            <a:lvl4pPr marL="1600200" indent="-228600">
-              <a:defRPr>
-                <a:solidFill>
-                  <a:schemeClr val="tx1"/>
-                </a:solidFill>
-                <a:latin typeface="Calibri" panose="020F0502020204030204" pitchFamily="34" charset="0"/>
-              </a:defRPr>
-            </a:lvl4pPr>
-            <a:lvl5pPr marL="2057400" indent="-228600">
-              <a:defRPr>
-                <a:solidFill>
-                  <a:schemeClr val="tx1"/>
-                </a:solidFill>
-                <a:latin typeface="Calibri" panose="020F0502020204030204" pitchFamily="34" charset="0"/>
-              </a:defRPr>
-            </a:lvl5pPr>
-            <a:lvl6pPr marL="2514600" indent="-228600" eaLnBrk="0" fontAlgn="base" hangingPunct="0">
-              <a:spcBef>
-                <a:spcPct val="0"/>
-              </a:spcBef>
-              <a:spcAft>
-                <a:spcPct val="0"/>
-              </a:spcAft>
-              <a:defRPr>
-                <a:solidFill>
-                  <a:schemeClr val="tx1"/>
-                </a:solidFill>
-                <a:latin typeface="Calibri" panose="020F0502020204030204" pitchFamily="34" charset="0"/>
-              </a:defRPr>
-            </a:lvl6pPr>
-            <a:lvl7pPr marL="2971800" indent="-228600" eaLnBrk="0" fontAlgn="base" hangingPunct="0">
-              <a:spcBef>
-                <a:spcPct val="0"/>
-              </a:spcBef>
-              <a:spcAft>
-                <a:spcPct val="0"/>
-              </a:spcAft>
-              <a:defRPr>
-                <a:solidFill>
-                  <a:schemeClr val="tx1"/>
-                </a:solidFill>
-                <a:latin typeface="Calibri" panose="020F0502020204030204" pitchFamily="34" charset="0"/>
-              </a:defRPr>
-            </a:lvl7pPr>
-            <a:lvl8pPr marL="3429000" indent="-228600" eaLnBrk="0" fontAlgn="base" hangingPunct="0">
-              <a:spcBef>
-                <a:spcPct val="0"/>
-              </a:spcBef>
-              <a:spcAft>
-                <a:spcPct val="0"/>
-              </a:spcAft>
-              <a:defRPr>
-                <a:solidFill>
-                  <a:schemeClr val="tx1"/>
-                </a:solidFill>
-                <a:latin typeface="Calibri" panose="020F0502020204030204" pitchFamily="34" charset="0"/>
-              </a:defRPr>
-            </a:lvl8pPr>
-            <a:lvl9pPr marL="3886200" indent="-228600" eaLnBrk="0" fontAlgn="base" hangingPunct="0">
-              <a:spcBef>
-                <a:spcPct val="0"/>
-              </a:spcBef>
-              <a:spcAft>
-                <a:spcPct val="0"/>
-              </a:spcAft>
-              <a:defRPr>
-                <a:solidFill>
-                  <a:schemeClr val="tx1"/>
-                </a:solidFill>
-                <a:latin typeface="Calibri" panose="020F0502020204030204" pitchFamily="34" charset="0"/>
-              </a:defRPr>
-            </a:lvl9pPr>
-          </a:lstStyle>
-          <a:p>
-            <a:pPr algn="ctr" eaLnBrk="1" hangingPunct="1"/>
-            <a:r>
-              <a:rPr lang="en-US" altLang="en-US" sz="1100" dirty="0">
-                <a:latin typeface="Arial" panose="020B0604020202020204" pitchFamily="34" charset="0"/>
-                <a:ea typeface="Amazon Ember" panose="020B0603020204020204" pitchFamily="34" charset="0"/>
-                <a:cs typeface="Arial" panose="020B0604020202020204" pitchFamily="34" charset="0"/>
-              </a:rPr>
-              <a:t>MySQL</a:t>
-            </a:r>
-          </a:p>
-          <a:p>
-            <a:pPr algn="ctr" eaLnBrk="1" hangingPunct="1"/>
-            <a:r>
-              <a:rPr lang="en-US" altLang="en-US" sz="1100" dirty="0">
-                <a:latin typeface="Arial" panose="020B0604020202020204" pitchFamily="34" charset="0"/>
-                <a:ea typeface="Amazon Ember" panose="020B0603020204020204" pitchFamily="34" charset="0"/>
-                <a:cs typeface="Arial" panose="020B0604020202020204" pitchFamily="34" charset="0"/>
-              </a:rPr>
-              <a:t>instance</a:t>
-            </a:r>
-          </a:p>
-        </p:txBody>
-      </p:sp>
-      <p:pic>
-        <p:nvPicPr>
-          <p:cNvPr id="134" name="Graphic 53">
-            <a:extLst>
-              <a:ext uri="{FF2B5EF4-FFF2-40B4-BE49-F238E27FC236}">
-                <a16:creationId xmlns:a16="http://schemas.microsoft.com/office/drawing/2014/main" id="{444D0993-9BD0-BC41-9F11-A62DAF8D57ED}"/>
-              </a:ext>
-            </a:extLst>
-          </p:cNvPr>
-          <p:cNvPicPr>
-            <a:picLocks noChangeAspect="1" noChangeArrowheads="1"/>
-          </p:cNvPicPr>
-          <p:nvPr/>
-        </p:nvPicPr>
-        <p:blipFill>
-          <a:blip r:embed="rId15">
-            <a:extLst>
-              <a:ext uri="{28A0092B-C50C-407E-A947-70E740481C1C}">
-                <a14:useLocalDpi xmlns:a14="http://schemas.microsoft.com/office/drawing/2010/main" val="0"/>
-              </a:ext>
-            </a:extLst>
-          </a:blip>
-          <a:srcRect/>
-          <a:stretch>
-            <a:fillRect/>
-          </a:stretch>
-        </p:blipFill>
-        <p:spPr bwMode="auto">
-          <a:xfrm>
-            <a:off x="12710160" y="7406640"/>
-            <a:ext cx="457200" cy="457200"/>
-          </a:xfrm>
-          <a:prstGeom prst="rect">
-            <a:avLst/>
-          </a:prstGeom>
-          <a:noFill/>
-          <a:ln>
-            <a:noFill/>
-          </a:ln>
-          <a:extLst>
-            <a:ext uri="{909E8E84-426E-40DD-AFC4-6F175D3DCCD1}">
-              <a14:hiddenFill xmlns:a14="http://schemas.microsoft.com/office/drawing/2010/main">
-                <a:solidFill>
-                  <a:srgbClr val="FFFFFF"/>
-                </a:solidFill>
-              </a14:hiddenFill>
-            </a:ext>
-            <a:ext uri="{91240B29-F687-4F45-9708-019B960494DF}">
-              <a14:hiddenLine xmlns:a14="http://schemas.microsoft.com/office/drawing/2010/main" w="9525">
-                <a:solidFill>
-                  <a:srgbClr val="000000"/>
-                </a:solidFill>
-                <a:miter lim="800000"/>
-                <a:headEnd/>
-                <a:tailEnd/>
-              </a14:hiddenLine>
-            </a:ext>
-          </a:extLst>
-        </p:spPr>
-      </p:pic>
-      <p:sp>
-        <p:nvSpPr>
-          <p:cNvPr id="135" name="TextBox 11">
-            <a:extLst>
-              <a:ext uri="{FF2B5EF4-FFF2-40B4-BE49-F238E27FC236}">
-                <a16:creationId xmlns:a16="http://schemas.microsoft.com/office/drawing/2014/main" id="{104F7910-11C9-8549-81A0-736EF823325E}"/>
-              </a:ext>
-            </a:extLst>
-          </p:cNvPr>
-          <p:cNvSpPr txBox="1">
-            <a:spLocks noChangeArrowheads="1"/>
-          </p:cNvSpPr>
-          <p:nvPr/>
-        </p:nvSpPr>
-        <p:spPr bwMode="auto">
-          <a:xfrm>
-            <a:off x="12184543" y="8974364"/>
-            <a:ext cx="1511300" cy="430887"/>
-          </a:xfrm>
-          <a:prstGeom prst="rect">
-            <a:avLst/>
-          </a:prstGeom>
-          <a:noFill/>
-          <a:ln>
-            <a:noFill/>
-          </a:ln>
-          <a:extLst>
-            <a:ext uri="{909E8E84-426E-40DD-AFC4-6F175D3DCCD1}">
-              <a14:hiddenFill xmlns:a14="http://schemas.microsoft.com/office/drawing/2010/main">
-                <a:solidFill>
-                  <a:srgbClr val="FFFFFF"/>
-                </a:solidFill>
-              </a14:hiddenFill>
-            </a:ext>
-            <a:ext uri="{91240B29-F687-4F45-9708-019B960494DF}">
-              <a14:hiddenLine xmlns:a14="http://schemas.microsoft.com/office/drawing/2010/main" w="9525">
-                <a:solidFill>
-                  <a:srgbClr val="000000"/>
-                </a:solidFill>
-                <a:miter lim="800000"/>
-                <a:headEnd/>
-                <a:tailEnd/>
-              </a14:hiddenLine>
-            </a:ext>
-          </a:extLst>
-        </p:spPr>
-        <p:txBody>
-          <a:bodyPr>
-            <a:spAutoFit/>
-          </a:bodyPr>
-          <a:lstStyle>
-            <a:lvl1pPr>
-              <a:defRPr>
-                <a:solidFill>
-                  <a:schemeClr val="tx1"/>
-                </a:solidFill>
-                <a:latin typeface="Calibri" panose="020F0502020204030204" pitchFamily="34" charset="0"/>
-              </a:defRPr>
-            </a:lvl1pPr>
-            <a:lvl2pPr marL="742950" indent="-285750">
-              <a:defRPr>
-                <a:solidFill>
-                  <a:schemeClr val="tx1"/>
-                </a:solidFill>
-                <a:latin typeface="Calibri" panose="020F0502020204030204" pitchFamily="34" charset="0"/>
-              </a:defRPr>
-            </a:lvl2pPr>
-            <a:lvl3pPr marL="1143000" indent="-228600">
-              <a:defRPr>
-                <a:solidFill>
-                  <a:schemeClr val="tx1"/>
-                </a:solidFill>
-                <a:latin typeface="Calibri" panose="020F0502020204030204" pitchFamily="34" charset="0"/>
-              </a:defRPr>
-            </a:lvl3pPr>
-            <a:lvl4pPr marL="1600200" indent="-228600">
-              <a:defRPr>
-                <a:solidFill>
-                  <a:schemeClr val="tx1"/>
-                </a:solidFill>
-                <a:latin typeface="Calibri" panose="020F0502020204030204" pitchFamily="34" charset="0"/>
-              </a:defRPr>
-            </a:lvl4pPr>
-            <a:lvl5pPr marL="2057400" indent="-228600">
-              <a:defRPr>
-                <a:solidFill>
-                  <a:schemeClr val="tx1"/>
-                </a:solidFill>
-                <a:latin typeface="Calibri" panose="020F0502020204030204" pitchFamily="34" charset="0"/>
-              </a:defRPr>
-            </a:lvl5pPr>
-            <a:lvl6pPr marL="2514600" indent="-228600" eaLnBrk="0" fontAlgn="base" hangingPunct="0">
-              <a:spcBef>
-                <a:spcPct val="0"/>
-              </a:spcBef>
-              <a:spcAft>
-                <a:spcPct val="0"/>
-              </a:spcAft>
-              <a:defRPr>
-                <a:solidFill>
-                  <a:schemeClr val="tx1"/>
-                </a:solidFill>
-                <a:latin typeface="Calibri" panose="020F0502020204030204" pitchFamily="34" charset="0"/>
-              </a:defRPr>
-            </a:lvl6pPr>
-            <a:lvl7pPr marL="2971800" indent="-228600" eaLnBrk="0" fontAlgn="base" hangingPunct="0">
-              <a:spcBef>
-                <a:spcPct val="0"/>
-              </a:spcBef>
-              <a:spcAft>
-                <a:spcPct val="0"/>
-              </a:spcAft>
-              <a:defRPr>
-                <a:solidFill>
-                  <a:schemeClr val="tx1"/>
-                </a:solidFill>
-                <a:latin typeface="Calibri" panose="020F0502020204030204" pitchFamily="34" charset="0"/>
-              </a:defRPr>
-            </a:lvl7pPr>
-            <a:lvl8pPr marL="3429000" indent="-228600" eaLnBrk="0" fontAlgn="base" hangingPunct="0">
-              <a:spcBef>
-                <a:spcPct val="0"/>
-              </a:spcBef>
-              <a:spcAft>
-                <a:spcPct val="0"/>
-              </a:spcAft>
-              <a:defRPr>
-                <a:solidFill>
-                  <a:schemeClr val="tx1"/>
-                </a:solidFill>
-                <a:latin typeface="Calibri" panose="020F0502020204030204" pitchFamily="34" charset="0"/>
-              </a:defRPr>
-            </a:lvl8pPr>
-            <a:lvl9pPr marL="3886200" indent="-228600" eaLnBrk="0" fontAlgn="base" hangingPunct="0">
-              <a:spcBef>
-                <a:spcPct val="0"/>
-              </a:spcBef>
-              <a:spcAft>
-                <a:spcPct val="0"/>
-              </a:spcAft>
-              <a:defRPr>
-                <a:solidFill>
-                  <a:schemeClr val="tx1"/>
-                </a:solidFill>
-                <a:latin typeface="Calibri" panose="020F0502020204030204" pitchFamily="34" charset="0"/>
-              </a:defRPr>
-            </a:lvl9pPr>
-          </a:lstStyle>
-          <a:p>
-            <a:pPr algn="ctr" eaLnBrk="1" hangingPunct="1"/>
-            <a:r>
-              <a:rPr lang="en-US" altLang="en-US" sz="1100" dirty="0">
-                <a:latin typeface="Arial" panose="020B0604020202020204" pitchFamily="34" charset="0"/>
-                <a:ea typeface="Amazon Ember" panose="020B0603020204020204" pitchFamily="34" charset="0"/>
-                <a:cs typeface="Arial" panose="020B0604020202020204" pitchFamily="34" charset="0"/>
-              </a:rPr>
-              <a:t>PostgreSQL </a:t>
-            </a:r>
-            <a:br>
-              <a:rPr lang="en-US" altLang="en-US" sz="1100" dirty="0">
-                <a:latin typeface="Arial" panose="020B0604020202020204" pitchFamily="34" charset="0"/>
-                <a:ea typeface="Amazon Ember" panose="020B0603020204020204" pitchFamily="34" charset="0"/>
-                <a:cs typeface="Arial" panose="020B0604020202020204" pitchFamily="34" charset="0"/>
-              </a:rPr>
-            </a:br>
-            <a:r>
-              <a:rPr lang="en-US" altLang="en-US" sz="1100" dirty="0">
-                <a:latin typeface="Arial" panose="020B0604020202020204" pitchFamily="34" charset="0"/>
-                <a:ea typeface="Amazon Ember" panose="020B0603020204020204" pitchFamily="34" charset="0"/>
-                <a:cs typeface="Arial" panose="020B0604020202020204" pitchFamily="34" charset="0"/>
-              </a:rPr>
-              <a:t>instance</a:t>
-            </a:r>
-          </a:p>
-        </p:txBody>
-      </p:sp>
-      <p:pic>
-        <p:nvPicPr>
-          <p:cNvPr id="136" name="Graphic 41">
-            <a:extLst>
-              <a:ext uri="{FF2B5EF4-FFF2-40B4-BE49-F238E27FC236}">
-                <a16:creationId xmlns:a16="http://schemas.microsoft.com/office/drawing/2014/main" id="{418B4DDD-66F2-2E4C-8D70-6B1B409ACCB0}"/>
-              </a:ext>
-            </a:extLst>
-          </p:cNvPr>
-          <p:cNvPicPr>
-            <a:picLocks noChangeAspect="1" noChangeArrowheads="1"/>
-          </p:cNvPicPr>
-          <p:nvPr/>
-        </p:nvPicPr>
-        <p:blipFill>
-          <a:blip r:embed="rId16">
-            <a:extLst>
-              <a:ext uri="{28A0092B-C50C-407E-A947-70E740481C1C}">
-                <a14:useLocalDpi xmlns:a14="http://schemas.microsoft.com/office/drawing/2010/main" val="0"/>
-              </a:ext>
-            </a:extLst>
-          </a:blip>
-          <a:srcRect/>
-          <a:stretch>
-            <a:fillRect/>
-          </a:stretch>
-        </p:blipFill>
-        <p:spPr bwMode="auto">
-          <a:xfrm>
-            <a:off x="12710160" y="8503920"/>
-            <a:ext cx="457200" cy="457200"/>
-          </a:xfrm>
-          <a:prstGeom prst="rect">
-            <a:avLst/>
-          </a:prstGeom>
-          <a:noFill/>
-          <a:ln>
-            <a:noFill/>
-          </a:ln>
-          <a:extLst>
-            <a:ext uri="{909E8E84-426E-40DD-AFC4-6F175D3DCCD1}">
-              <a14:hiddenFill xmlns:a14="http://schemas.microsoft.com/office/drawing/2010/main">
-                <a:solidFill>
-                  <a:srgbClr val="FFFFFF"/>
-                </a:solidFill>
-              </a14:hiddenFill>
-            </a:ext>
-            <a:ext uri="{91240B29-F687-4F45-9708-019B960494DF}">
-              <a14:hiddenLine xmlns:a14="http://schemas.microsoft.com/office/drawing/2010/main" w="9525">
-                <a:solidFill>
-                  <a:srgbClr val="000000"/>
-                </a:solidFill>
-                <a:miter lim="800000"/>
-                <a:headEnd/>
-                <a:tailEnd/>
-              </a14:hiddenLine>
-            </a:ext>
-          </a:extLst>
-        </p:spPr>
-      </p:pic>
       <p:pic>
         <p:nvPicPr>
           <p:cNvPr id="76" name="Graphic 11">
@@ -10061,7 +9110,7 @@
           <p:nvPr/>
         </p:nvPicPr>
         <p:blipFill>
-          <a:blip r:embed="rId17">
+          <a:blip r:embed="rId13">
             <a:extLst>
               <a:ext uri="{28A0092B-C50C-407E-A947-70E740481C1C}">
                 <a14:useLocalDpi xmlns:a14="http://schemas.microsoft.com/office/drawing/2010/main" val="0"/>
@@ -10075,7 +9124,7 @@
         </p:blipFill>
         <p:spPr bwMode="auto">
           <a:xfrm>
-            <a:off x="12710160" y="6400800"/>
+            <a:off x="11964195" y="6161895"/>
             <a:ext cx="469900" cy="469900"/>
           </a:xfrm>
           <a:prstGeom prst="rect">

</xml_diff>